<commit_message>
Updated documentation and READMEs
</commit_message>
<xml_diff>
--- a/LyncMeetingTranscript.pptx
+++ b/LyncMeetingTranscript.pptx
@@ -6,9 +6,21 @@
   </p:sldMasterIdLst>
   <p:sldIdLst>
     <p:sldId id="256" r:id="rId2"/>
-    <p:sldId id="257" r:id="rId3"/>
-    <p:sldId id="258" r:id="rId4"/>
-    <p:sldId id="259" r:id="rId5"/>
+    <p:sldId id="260" r:id="rId3"/>
+    <p:sldId id="271" r:id="rId4"/>
+    <p:sldId id="270" r:id="rId5"/>
+    <p:sldId id="261" r:id="rId6"/>
+    <p:sldId id="262" r:id="rId7"/>
+    <p:sldId id="269" r:id="rId8"/>
+    <p:sldId id="257" r:id="rId9"/>
+    <p:sldId id="258" r:id="rId10"/>
+    <p:sldId id="265" r:id="rId11"/>
+    <p:sldId id="259" r:id="rId12"/>
+    <p:sldId id="264" r:id="rId13"/>
+    <p:sldId id="263" r:id="rId14"/>
+    <p:sldId id="266" r:id="rId15"/>
+    <p:sldId id="267" r:id="rId16"/>
+    <p:sldId id="268" r:id="rId17"/>
   </p:sldIdLst>
   <p:sldSz cx="12192000" cy="6858000"/>
   <p:notesSz cx="6858000" cy="9144000"/>
@@ -107,6 +119,11 @@
       </a:defRPr>
     </a:lvl9pPr>
   </p:defaultTextStyle>
+  <p:extLst>
+    <p:ext uri="{EFAFB233-063F-42B5-8137-9DF3F51BA10A}">
+      <p15:sldGuideLst xmlns:p15="http://schemas.microsoft.com/office/powerpoint/2012/main"/>
+    </p:ext>
+  </p:extLst>
 </p:presentation>
 </file>
 
@@ -241,7 +258,7 @@
           <a:p>
             <a:fld id="{3771DC32-3F6B-4FDD-8EE3-3A305039A0F8}" type="datetimeFigureOut">
               <a:rPr lang="en-US" smtClean="0"/>
-              <a:t>10/14/2014</a:t>
+              <a:t>11/14/2014</a:t>
             </a:fld>
             <a:endParaRPr lang="en-US"/>
           </a:p>
@@ -411,7 +428,7 @@
           <a:p>
             <a:fld id="{3771DC32-3F6B-4FDD-8EE3-3A305039A0F8}" type="datetimeFigureOut">
               <a:rPr lang="en-US" smtClean="0"/>
-              <a:t>10/14/2014</a:t>
+              <a:t>11/14/2014</a:t>
             </a:fld>
             <a:endParaRPr lang="en-US"/>
           </a:p>
@@ -591,7 +608,7 @@
           <a:p>
             <a:fld id="{3771DC32-3F6B-4FDD-8EE3-3A305039A0F8}" type="datetimeFigureOut">
               <a:rPr lang="en-US" smtClean="0"/>
-              <a:t>10/14/2014</a:t>
+              <a:t>11/14/2014</a:t>
             </a:fld>
             <a:endParaRPr lang="en-US"/>
           </a:p>
@@ -761,7 +778,7 @@
           <a:p>
             <a:fld id="{3771DC32-3F6B-4FDD-8EE3-3A305039A0F8}" type="datetimeFigureOut">
               <a:rPr lang="en-US" smtClean="0"/>
-              <a:t>10/14/2014</a:t>
+              <a:t>11/14/2014</a:t>
             </a:fld>
             <a:endParaRPr lang="en-US"/>
           </a:p>
@@ -1007,7 +1024,7 @@
           <a:p>
             <a:fld id="{3771DC32-3F6B-4FDD-8EE3-3A305039A0F8}" type="datetimeFigureOut">
               <a:rPr lang="en-US" smtClean="0"/>
-              <a:t>10/14/2014</a:t>
+              <a:t>11/14/2014</a:t>
             </a:fld>
             <a:endParaRPr lang="en-US"/>
           </a:p>
@@ -1239,7 +1256,7 @@
           <a:p>
             <a:fld id="{3771DC32-3F6B-4FDD-8EE3-3A305039A0F8}" type="datetimeFigureOut">
               <a:rPr lang="en-US" smtClean="0"/>
-              <a:t>10/14/2014</a:t>
+              <a:t>11/14/2014</a:t>
             </a:fld>
             <a:endParaRPr lang="en-US"/>
           </a:p>
@@ -1606,7 +1623,7 @@
           <a:p>
             <a:fld id="{3771DC32-3F6B-4FDD-8EE3-3A305039A0F8}" type="datetimeFigureOut">
               <a:rPr lang="en-US" smtClean="0"/>
-              <a:t>10/14/2014</a:t>
+              <a:t>11/14/2014</a:t>
             </a:fld>
             <a:endParaRPr lang="en-US"/>
           </a:p>
@@ -1724,7 +1741,7 @@
           <a:p>
             <a:fld id="{3771DC32-3F6B-4FDD-8EE3-3A305039A0F8}" type="datetimeFigureOut">
               <a:rPr lang="en-US" smtClean="0"/>
-              <a:t>10/14/2014</a:t>
+              <a:t>11/14/2014</a:t>
             </a:fld>
             <a:endParaRPr lang="en-US"/>
           </a:p>
@@ -1819,7 +1836,7 @@
           <a:p>
             <a:fld id="{3771DC32-3F6B-4FDD-8EE3-3A305039A0F8}" type="datetimeFigureOut">
               <a:rPr lang="en-US" smtClean="0"/>
-              <a:t>10/14/2014</a:t>
+              <a:t>11/14/2014</a:t>
             </a:fld>
             <a:endParaRPr lang="en-US"/>
           </a:p>
@@ -2096,7 +2113,7 @@
           <a:p>
             <a:fld id="{3771DC32-3F6B-4FDD-8EE3-3A305039A0F8}" type="datetimeFigureOut">
               <a:rPr lang="en-US" smtClean="0"/>
-              <a:t>10/14/2014</a:t>
+              <a:t>11/14/2014</a:t>
             </a:fld>
             <a:endParaRPr lang="en-US"/>
           </a:p>
@@ -2349,7 +2366,7 @@
           <a:p>
             <a:fld id="{3771DC32-3F6B-4FDD-8EE3-3A305039A0F8}" type="datetimeFigureOut">
               <a:rPr lang="en-US" smtClean="0"/>
-              <a:t>10/14/2014</a:t>
+              <a:t>11/14/2014</a:t>
             </a:fld>
             <a:endParaRPr lang="en-US"/>
           </a:p>
@@ -2562,7 +2579,7 @@
           <a:p>
             <a:fld id="{3771DC32-3F6B-4FDD-8EE3-3A305039A0F8}" type="datetimeFigureOut">
               <a:rPr lang="en-US" smtClean="0"/>
-              <a:t>10/14/2014</a:t>
+              <a:t>11/14/2014</a:t>
             </a:fld>
             <a:endParaRPr lang="en-US"/>
           </a:p>
@@ -3006,10 +3023,9 @@
           <a:lstStyle/>
           <a:p>
             <a:r>
-              <a:rPr lang="en-US" dirty="0" err="1" smtClean="0"/>
-              <a:t>SamiL</a:t>
-            </a:r>
-            <a:endParaRPr lang="en-US" dirty="0"/>
+              <a:rPr lang="en-US" dirty="0"/>
+              <a:t>Real-time transcripts of Lync meetings</a:t>
+            </a:r>
           </a:p>
         </p:txBody>
       </p:sp>
@@ -3033,7 +3049,1764 @@
 </p:sld>
 </file>
 
+<file path=ppt/slides/slide10.xml><?xml version="1.0" encoding="utf-8"?>
+<p:sld xmlns:a="http://schemas.openxmlformats.org/drawingml/2006/main" xmlns:r="http://schemas.openxmlformats.org/officeDocument/2006/relationships" xmlns:p="http://schemas.openxmlformats.org/presentationml/2006/main">
+  <p:cSld>
+    <p:spTree>
+      <p:nvGrpSpPr>
+        <p:cNvPr id="1" name=""/>
+        <p:cNvGrpSpPr/>
+        <p:nvPr/>
+      </p:nvGrpSpPr>
+      <p:grpSpPr>
+        <a:xfrm>
+          <a:off x="0" y="0"/>
+          <a:ext cx="0" cy="0"/>
+          <a:chOff x="0" y="0"/>
+          <a:chExt cx="0" cy="0"/>
+        </a:xfrm>
+      </p:grpSpPr>
+      <p:sp>
+        <p:nvSpPr>
+          <p:cNvPr id="2" name="Title 1"/>
+          <p:cNvSpPr>
+            <a:spLocks noGrp="1"/>
+          </p:cNvSpPr>
+          <p:nvPr>
+            <p:ph type="title"/>
+          </p:nvPr>
+        </p:nvSpPr>
+        <p:spPr/>
+        <p:txBody>
+          <a:bodyPr/>
+          <a:lstStyle/>
+          <a:p>
+            <a:r>
+              <a:rPr lang="en-US" dirty="0" smtClean="0"/>
+              <a:t>Demo</a:t>
+            </a:r>
+            <a:endParaRPr lang="en-US" dirty="0"/>
+          </a:p>
+        </p:txBody>
+      </p:sp>
+      <p:sp>
+        <p:nvSpPr>
+          <p:cNvPr id="3" name="Content Placeholder 2"/>
+          <p:cNvSpPr>
+            <a:spLocks noGrp="1"/>
+          </p:cNvSpPr>
+          <p:nvPr>
+            <p:ph idx="1"/>
+          </p:nvPr>
+        </p:nvSpPr>
+        <p:spPr/>
+        <p:txBody>
+          <a:bodyPr/>
+          <a:lstStyle/>
+          <a:p>
+            <a:r>
+              <a:rPr lang="en-US" dirty="0"/>
+              <a:t>B</a:t>
+            </a:r>
+            <a:r>
+              <a:rPr lang="en-US" dirty="0" smtClean="0"/>
+              <a:t>ots </a:t>
+            </a:r>
+            <a:r>
+              <a:rPr lang="en-US" dirty="0"/>
+              <a:t>in </a:t>
+            </a:r>
+            <a:r>
+              <a:rPr lang="en-US" dirty="0" err="1"/>
+              <a:t>AVconf</a:t>
+            </a:r>
+            <a:r>
+              <a:rPr lang="en-US" dirty="0"/>
+              <a:t> doing talking and sharing</a:t>
+            </a:r>
+          </a:p>
+        </p:txBody>
+      </p:sp>
+    </p:spTree>
+    <p:extLst>
+      <p:ext uri="{BB962C8B-B14F-4D97-AF65-F5344CB8AC3E}">
+        <p14:creationId xmlns:p14="http://schemas.microsoft.com/office/powerpoint/2010/main" val="2070206930"/>
+      </p:ext>
+    </p:extLst>
+  </p:cSld>
+  <p:clrMapOvr>
+    <a:masterClrMapping/>
+  </p:clrMapOvr>
+  <p:timing>
+    <p:tnLst>
+      <p:par>
+        <p:cTn id="1" dur="indefinite" restart="never" nodeType="tmRoot"/>
+      </p:par>
+    </p:tnLst>
+  </p:timing>
+</p:sld>
+</file>
+
+<file path=ppt/slides/slide11.xml><?xml version="1.0" encoding="utf-8"?>
+<p:sld xmlns:a="http://schemas.openxmlformats.org/drawingml/2006/main" xmlns:r="http://schemas.openxmlformats.org/officeDocument/2006/relationships" xmlns:p="http://schemas.openxmlformats.org/presentationml/2006/main">
+  <p:cSld>
+    <p:spTree>
+      <p:nvGrpSpPr>
+        <p:cNvPr id="1" name=""/>
+        <p:cNvGrpSpPr/>
+        <p:nvPr/>
+      </p:nvGrpSpPr>
+      <p:grpSpPr>
+        <a:xfrm>
+          <a:off x="0" y="0"/>
+          <a:ext cx="0" cy="0"/>
+          <a:chOff x="0" y="0"/>
+          <a:chExt cx="0" cy="0"/>
+        </a:xfrm>
+      </p:grpSpPr>
+      <p:sp>
+        <p:nvSpPr>
+          <p:cNvPr id="3" name="Title 2"/>
+          <p:cNvSpPr>
+            <a:spLocks noGrp="1"/>
+          </p:cNvSpPr>
+          <p:nvPr>
+            <p:ph type="title"/>
+          </p:nvPr>
+        </p:nvSpPr>
+        <p:spPr/>
+        <p:txBody>
+          <a:bodyPr/>
+          <a:lstStyle/>
+          <a:p>
+            <a:r>
+              <a:rPr lang="en-US" dirty="0" smtClean="0"/>
+              <a:t>Sample </a:t>
+            </a:r>
+            <a:r>
+              <a:rPr lang="en-US" dirty="0" err="1" smtClean="0"/>
+              <a:t>BotApplication</a:t>
+            </a:r>
+            <a:r>
+              <a:rPr lang="en-US" dirty="0"/>
+              <a:t> </a:t>
+            </a:r>
+            <a:r>
+              <a:rPr lang="en-US" dirty="0" smtClean="0"/>
+              <a:t>Output Transcript:</a:t>
+            </a:r>
+            <a:endParaRPr lang="en-US" dirty="0"/>
+          </a:p>
+        </p:txBody>
+      </p:sp>
+      <p:sp>
+        <p:nvSpPr>
+          <p:cNvPr id="2" name="Content Placeholder 1"/>
+          <p:cNvSpPr>
+            <a:spLocks noGrp="1"/>
+          </p:cNvSpPr>
+          <p:nvPr>
+            <p:ph idx="1"/>
+          </p:nvPr>
+        </p:nvSpPr>
+        <p:spPr/>
+        <p:txBody>
+          <a:bodyPr/>
+          <a:lstStyle/>
+          <a:p>
+            <a:endParaRPr lang="en-US"/>
+          </a:p>
+        </p:txBody>
+      </p:sp>
+    </p:spTree>
+    <p:extLst>
+      <p:ext uri="{BB962C8B-B14F-4D97-AF65-F5344CB8AC3E}">
+        <p14:creationId xmlns:p14="http://schemas.microsoft.com/office/powerpoint/2010/main" val="4068842830"/>
+      </p:ext>
+    </p:extLst>
+  </p:cSld>
+  <p:clrMapOvr>
+    <a:masterClrMapping/>
+  </p:clrMapOvr>
+  <p:timing>
+    <p:tnLst>
+      <p:par>
+        <p:cTn id="1" dur="indefinite" restart="never" nodeType="tmRoot"/>
+      </p:par>
+    </p:tnLst>
+  </p:timing>
+</p:sld>
+</file>
+
+<file path=ppt/slides/slide12.xml><?xml version="1.0" encoding="utf-8"?>
+<p:sld xmlns:a="http://schemas.openxmlformats.org/drawingml/2006/main" xmlns:r="http://schemas.openxmlformats.org/officeDocument/2006/relationships" xmlns:p="http://schemas.openxmlformats.org/presentationml/2006/main">
+  <p:cSld>
+    <p:spTree>
+      <p:nvGrpSpPr>
+        <p:cNvPr id="1" name=""/>
+        <p:cNvGrpSpPr/>
+        <p:nvPr/>
+      </p:nvGrpSpPr>
+      <p:grpSpPr>
+        <a:xfrm>
+          <a:off x="0" y="0"/>
+          <a:ext cx="0" cy="0"/>
+          <a:chOff x="0" y="0"/>
+          <a:chExt cx="0" cy="0"/>
+        </a:xfrm>
+      </p:grpSpPr>
+      <p:sp>
+        <p:nvSpPr>
+          <p:cNvPr id="2" name="Title 1"/>
+          <p:cNvSpPr>
+            <a:spLocks noGrp="1"/>
+          </p:cNvSpPr>
+          <p:nvPr>
+            <p:ph type="title"/>
+          </p:nvPr>
+        </p:nvSpPr>
+        <p:spPr/>
+        <p:txBody>
+          <a:bodyPr/>
+          <a:lstStyle/>
+          <a:p>
+            <a:r>
+              <a:rPr lang="en-US" dirty="0" smtClean="0"/>
+              <a:t>Results</a:t>
+            </a:r>
+            <a:endParaRPr lang="en-US" dirty="0"/>
+          </a:p>
+        </p:txBody>
+      </p:sp>
+      <p:sp>
+        <p:nvSpPr>
+          <p:cNvPr id="3" name="Content Placeholder 2"/>
+          <p:cNvSpPr>
+            <a:spLocks noGrp="1"/>
+          </p:cNvSpPr>
+          <p:nvPr>
+            <p:ph idx="1"/>
+          </p:nvPr>
+        </p:nvSpPr>
+        <p:spPr/>
+        <p:txBody>
+          <a:bodyPr/>
+          <a:lstStyle/>
+          <a:p>
+            <a:endParaRPr lang="en-US"/>
+          </a:p>
+        </p:txBody>
+      </p:sp>
+    </p:spTree>
+    <p:extLst>
+      <p:ext uri="{BB962C8B-B14F-4D97-AF65-F5344CB8AC3E}">
+        <p14:creationId xmlns:p14="http://schemas.microsoft.com/office/powerpoint/2010/main" val="3798161281"/>
+      </p:ext>
+    </p:extLst>
+  </p:cSld>
+  <p:clrMapOvr>
+    <a:masterClrMapping/>
+  </p:clrMapOvr>
+  <p:timing>
+    <p:tnLst>
+      <p:par>
+        <p:cTn id="1" dur="indefinite" restart="never" nodeType="tmRoot"/>
+      </p:par>
+    </p:tnLst>
+  </p:timing>
+</p:sld>
+</file>
+
+<file path=ppt/slides/slide13.xml><?xml version="1.0" encoding="utf-8"?>
+<p:sld xmlns:a="http://schemas.openxmlformats.org/drawingml/2006/main" xmlns:r="http://schemas.openxmlformats.org/officeDocument/2006/relationships" xmlns:p="http://schemas.openxmlformats.org/presentationml/2006/main">
+  <p:cSld>
+    <p:spTree>
+      <p:nvGrpSpPr>
+        <p:cNvPr id="1" name=""/>
+        <p:cNvGrpSpPr/>
+        <p:nvPr/>
+      </p:nvGrpSpPr>
+      <p:grpSpPr>
+        <a:xfrm>
+          <a:off x="0" y="0"/>
+          <a:ext cx="0" cy="0"/>
+          <a:chOff x="0" y="0"/>
+          <a:chExt cx="0" cy="0"/>
+        </a:xfrm>
+      </p:grpSpPr>
+      <p:sp>
+        <p:nvSpPr>
+          <p:cNvPr id="2" name="Title 1"/>
+          <p:cNvSpPr>
+            <a:spLocks noGrp="1"/>
+          </p:cNvSpPr>
+          <p:nvPr>
+            <p:ph type="title"/>
+          </p:nvPr>
+        </p:nvSpPr>
+        <p:spPr/>
+        <p:txBody>
+          <a:bodyPr/>
+          <a:lstStyle/>
+          <a:p>
+            <a:r>
+              <a:rPr lang="en-US" dirty="0" smtClean="0"/>
+              <a:t>Conclusions &amp; Future Work</a:t>
+            </a:r>
+            <a:endParaRPr lang="en-US" dirty="0"/>
+          </a:p>
+        </p:txBody>
+      </p:sp>
+      <p:sp>
+        <p:nvSpPr>
+          <p:cNvPr id="3" name="Content Placeholder 2"/>
+          <p:cNvSpPr>
+            <a:spLocks noGrp="1"/>
+          </p:cNvSpPr>
+          <p:nvPr>
+            <p:ph idx="1"/>
+          </p:nvPr>
+        </p:nvSpPr>
+        <p:spPr/>
+        <p:txBody>
+          <a:bodyPr/>
+          <a:lstStyle/>
+          <a:p>
+            <a:r>
+              <a:rPr lang="en-US" dirty="0" smtClean="0"/>
+              <a:t>Lync </a:t>
+            </a:r>
+            <a:endParaRPr lang="en-US" dirty="0"/>
+          </a:p>
+        </p:txBody>
+      </p:sp>
+    </p:spTree>
+    <p:extLst>
+      <p:ext uri="{BB962C8B-B14F-4D97-AF65-F5344CB8AC3E}">
+        <p14:creationId xmlns:p14="http://schemas.microsoft.com/office/powerpoint/2010/main" val="2794381316"/>
+      </p:ext>
+    </p:extLst>
+  </p:cSld>
+  <p:clrMapOvr>
+    <a:masterClrMapping/>
+  </p:clrMapOvr>
+  <p:timing>
+    <p:tnLst>
+      <p:par>
+        <p:cTn id="1" dur="indefinite" restart="never" nodeType="tmRoot"/>
+      </p:par>
+    </p:tnLst>
+  </p:timing>
+</p:sld>
+</file>
+
+<file path=ppt/slides/slide14.xml><?xml version="1.0" encoding="utf-8"?>
+<p:sld xmlns:a="http://schemas.openxmlformats.org/drawingml/2006/main" xmlns:r="http://schemas.openxmlformats.org/officeDocument/2006/relationships" xmlns:p="http://schemas.openxmlformats.org/presentationml/2006/main">
+  <p:cSld>
+    <p:spTree>
+      <p:nvGrpSpPr>
+        <p:cNvPr id="1" name=""/>
+        <p:cNvGrpSpPr/>
+        <p:nvPr/>
+      </p:nvGrpSpPr>
+      <p:grpSpPr>
+        <a:xfrm>
+          <a:off x="0" y="0"/>
+          <a:ext cx="0" cy="0"/>
+          <a:chOff x="0" y="0"/>
+          <a:chExt cx="0" cy="0"/>
+        </a:xfrm>
+      </p:grpSpPr>
+      <p:sp>
+        <p:nvSpPr>
+          <p:cNvPr id="4" name="Title 3"/>
+          <p:cNvSpPr>
+            <a:spLocks noGrp="1"/>
+          </p:cNvSpPr>
+          <p:nvPr>
+            <p:ph type="title"/>
+          </p:nvPr>
+        </p:nvSpPr>
+        <p:spPr/>
+        <p:txBody>
+          <a:bodyPr>
+            <a:normAutofit fontScale="90000"/>
+          </a:bodyPr>
+          <a:lstStyle/>
+          <a:p>
+            <a:r>
+              <a:rPr lang="en-US" dirty="0"/>
+              <a:t>Asking fewer things from life is actually a very powerful strategy for dealing with an </a:t>
+            </a:r>
+            <a:r>
+              <a:rPr lang="en-US" dirty="0" smtClean="0"/>
+              <a:t>adversarial </a:t>
+            </a:r>
+            <a:r>
+              <a:rPr lang="en-US" dirty="0"/>
+              <a:t>world.</a:t>
+            </a:r>
+          </a:p>
+        </p:txBody>
+      </p:sp>
+    </p:spTree>
+    <p:extLst>
+      <p:ext uri="{BB962C8B-B14F-4D97-AF65-F5344CB8AC3E}">
+        <p14:creationId xmlns:p14="http://schemas.microsoft.com/office/powerpoint/2010/main" val="194698089"/>
+      </p:ext>
+    </p:extLst>
+  </p:cSld>
+  <p:clrMapOvr>
+    <a:masterClrMapping/>
+  </p:clrMapOvr>
+  <p:timing>
+    <p:tnLst>
+      <p:par>
+        <p:cTn id="1" dur="indefinite" restart="never" nodeType="tmRoot"/>
+      </p:par>
+    </p:tnLst>
+  </p:timing>
+</p:sld>
+</file>
+
+<file path=ppt/slides/slide15.xml><?xml version="1.0" encoding="utf-8"?>
+<p:sld xmlns:a="http://schemas.openxmlformats.org/drawingml/2006/main" xmlns:r="http://schemas.openxmlformats.org/officeDocument/2006/relationships" xmlns:p="http://schemas.openxmlformats.org/presentationml/2006/main">
+  <p:cSld>
+    <p:spTree>
+      <p:nvGrpSpPr>
+        <p:cNvPr id="1" name=""/>
+        <p:cNvGrpSpPr/>
+        <p:nvPr/>
+      </p:nvGrpSpPr>
+      <p:grpSpPr>
+        <a:xfrm>
+          <a:off x="0" y="0"/>
+          <a:ext cx="0" cy="0"/>
+          <a:chOff x="0" y="0"/>
+          <a:chExt cx="0" cy="0"/>
+        </a:xfrm>
+      </p:grpSpPr>
+      <p:sp>
+        <p:nvSpPr>
+          <p:cNvPr id="2" name="Title 1"/>
+          <p:cNvSpPr>
+            <a:spLocks noGrp="1"/>
+          </p:cNvSpPr>
+          <p:nvPr>
+            <p:ph type="title"/>
+          </p:nvPr>
+        </p:nvSpPr>
+        <p:spPr/>
+        <p:txBody>
+          <a:bodyPr/>
+          <a:lstStyle/>
+          <a:p>
+            <a:r>
+              <a:rPr lang="en-US" dirty="0" smtClean="0"/>
+              <a:t>Resources</a:t>
+            </a:r>
+            <a:endParaRPr lang="en-US" dirty="0"/>
+          </a:p>
+        </p:txBody>
+      </p:sp>
+      <p:sp>
+        <p:nvSpPr>
+          <p:cNvPr id="3" name="Content Placeholder 2"/>
+          <p:cNvSpPr>
+            <a:spLocks noGrp="1"/>
+          </p:cNvSpPr>
+          <p:nvPr>
+            <p:ph idx="1"/>
+          </p:nvPr>
+        </p:nvSpPr>
+        <p:spPr/>
+        <p:txBody>
+          <a:bodyPr>
+            <a:normAutofit fontScale="62500" lnSpcReduction="20000"/>
+          </a:bodyPr>
+          <a:lstStyle/>
+          <a:p>
+            <a:r>
+              <a:rPr lang="en-US" dirty="0" smtClean="0"/>
+              <a:t>Skype </a:t>
+            </a:r>
+            <a:r>
+              <a:rPr lang="en-US" dirty="0" err="1" smtClean="0"/>
+              <a:t>Comm</a:t>
+            </a:r>
+            <a:r>
+              <a:rPr lang="en-US" dirty="0" smtClean="0"/>
+              <a:t> Fair Project </a:t>
+            </a:r>
+            <a:r>
+              <a:rPr lang="en-US" dirty="0" err="1" smtClean="0"/>
+              <a:t>Site:</a:t>
+            </a:r>
+            <a:r>
+              <a:rPr lang="en-US" dirty="0" err="1" smtClean="0">
+                <a:hlinkClick r:id="rId2"/>
+              </a:rPr>
+              <a:t>http</a:t>
+            </a:r>
+            <a:r>
+              <a:rPr lang="en-US" dirty="0">
+                <a:hlinkClick r:id="rId2"/>
+              </a:rPr>
+              <a:t>://aka.ms/</a:t>
+            </a:r>
+            <a:r>
+              <a:rPr lang="en-US" dirty="0" err="1">
+                <a:hlinkClick r:id="rId2"/>
+              </a:rPr>
+              <a:t>CommSF</a:t>
+            </a:r>
+            <a:endParaRPr lang="en-US" dirty="0" smtClean="0"/>
+          </a:p>
+          <a:p>
+            <a:r>
+              <a:rPr lang="en-US" dirty="0" err="1" smtClean="0"/>
+              <a:t>Github</a:t>
+            </a:r>
+            <a:r>
+              <a:rPr lang="en-US" dirty="0"/>
+              <a:t>: </a:t>
+            </a:r>
+            <a:r>
+              <a:rPr lang="en-US" dirty="0">
+                <a:hlinkClick r:id="rId3"/>
+              </a:rPr>
+              <a:t>https://github.com/saluber/LyncMeetingTranscript</a:t>
+            </a:r>
+            <a:r>
+              <a:rPr lang="en-US" dirty="0" smtClean="0">
+                <a:hlinkClick r:id="rId3"/>
+              </a:rPr>
+              <a:t>/</a:t>
+            </a:r>
+            <a:endParaRPr lang="en-US" dirty="0" smtClean="0"/>
+          </a:p>
+          <a:p>
+            <a:r>
+              <a:rPr lang="en-US" dirty="0" smtClean="0"/>
+              <a:t>UCMA 3.0 </a:t>
+            </a:r>
+            <a:r>
+              <a:rPr lang="en-US" dirty="0"/>
+              <a:t>General Reference: </a:t>
+            </a:r>
+            <a:r>
+              <a:rPr lang="en-US" dirty="0">
+                <a:hlinkClick r:id="rId4"/>
+              </a:rPr>
+              <a:t>http://msdn.microsoft.com/en-us/library/office/hh347320(v=office.14).</a:t>
+            </a:r>
+            <a:r>
+              <a:rPr lang="en-US" dirty="0" smtClean="0">
+                <a:hlinkClick r:id="rId4"/>
+              </a:rPr>
+              <a:t>aspx</a:t>
+            </a:r>
+            <a:endParaRPr lang="en-US" dirty="0" smtClean="0"/>
+          </a:p>
+          <a:p>
+            <a:endParaRPr lang="en-US" dirty="0" smtClean="0"/>
+          </a:p>
+          <a:p>
+            <a:r>
+              <a:rPr lang="en-US" dirty="0"/>
+              <a:t>The complete SDK for the Microsoft Server Speech Platform 10.2 version is available at </a:t>
+            </a:r>
+            <a:r>
+              <a:rPr lang="en-US" dirty="0">
+                <a:hlinkClick r:id="rId5"/>
+              </a:rPr>
+              <a:t>http://www.microsoft.com/downloads/en/details.aspx?FamilyID=1b1604d3-4f66-4241-9a21-90a294a5c9a4</a:t>
+            </a:r>
+            <a:r>
+              <a:rPr lang="en-US" dirty="0"/>
+              <a:t>. </a:t>
+            </a:r>
+            <a:endParaRPr lang="en-US" dirty="0" smtClean="0"/>
+          </a:p>
+          <a:p>
+            <a:r>
+              <a:rPr lang="en-US" dirty="0">
+                <a:hlinkClick r:id="rId6"/>
+              </a:rPr>
+              <a:t>http://</a:t>
+            </a:r>
+            <a:r>
+              <a:rPr lang="en-US" dirty="0" smtClean="0">
+                <a:hlinkClick r:id="rId6"/>
+              </a:rPr>
+              <a:t>msdn.microsoft.com/en-us/magazine/cc163663.aspx</a:t>
+            </a:r>
+            <a:endParaRPr lang="en-US" dirty="0" smtClean="0"/>
+          </a:p>
+          <a:p>
+            <a:r>
+              <a:rPr lang="en-US" dirty="0" smtClean="0">
+                <a:hlinkClick r:id="rId7"/>
+              </a:rPr>
+              <a:t>UCMA Managed API 2.0 Speech SDK Documentation</a:t>
+            </a:r>
+            <a:endParaRPr lang="en-US" dirty="0" smtClean="0"/>
+          </a:p>
+          <a:p>
+            <a:r>
+              <a:rPr lang="en-US" dirty="0" smtClean="0">
+                <a:hlinkClick r:id="rId8"/>
+              </a:rPr>
+              <a:t>Microsoft Server Speech Platform 10.1 </a:t>
+            </a:r>
+            <a:r>
+              <a:rPr lang="en-US" dirty="0" smtClean="0"/>
+              <a:t>(Runtime, Language packs, and Server SDK)</a:t>
+            </a:r>
+          </a:p>
+          <a:p>
+            <a:r>
+              <a:rPr lang="en-US" dirty="0" smtClean="0">
+                <a:hlinkClick r:id="rId9"/>
+              </a:rPr>
+              <a:t>UCMA Managed API 2.0 Core SDK Documentation</a:t>
+            </a:r>
+            <a:endParaRPr lang="en-US" dirty="0" smtClean="0"/>
+          </a:p>
+          <a:p>
+            <a:r>
+              <a:rPr lang="en-US" dirty="0" smtClean="0">
+                <a:hlinkClick r:id="rId10"/>
+              </a:rPr>
+              <a:t>UCMA 2.0 Core SDK Documentation</a:t>
+            </a:r>
+            <a:endParaRPr lang="en-US" dirty="0" smtClean="0"/>
+          </a:p>
+          <a:p>
+            <a:r>
+              <a:rPr lang="en-US" dirty="0" smtClean="0">
+                <a:hlinkClick r:id="rId11"/>
+              </a:rPr>
+              <a:t>UCMA 2.0 Workflow SDK Documentation</a:t>
+            </a:r>
+            <a:endParaRPr lang="en-US" dirty="0" smtClean="0"/>
+          </a:p>
+          <a:p>
+            <a:r>
+              <a:rPr lang="en-US" dirty="0" smtClean="0">
+                <a:hlinkClick r:id="rId12"/>
+              </a:rPr>
+              <a:t>UCMA 2.0 Speech SDK Documentation</a:t>
+            </a:r>
+            <a:endParaRPr lang="en-US" dirty="0" smtClean="0"/>
+          </a:p>
+          <a:p>
+            <a:pPr lvl="1"/>
+            <a:r>
+              <a:rPr lang="en-US" dirty="0" smtClean="0"/>
+              <a:t>Speech </a:t>
+            </a:r>
+            <a:r>
+              <a:rPr lang="en-US" dirty="0"/>
+              <a:t>Class Library: </a:t>
+            </a:r>
+            <a:r>
+              <a:rPr lang="en-US" dirty="0">
+                <a:hlinkClick r:id="rId13"/>
+              </a:rPr>
+              <a:t>http://msdn.microsoft.com/en-us/library/dd167835(v=office.13).</a:t>
+            </a:r>
+            <a:r>
+              <a:rPr lang="en-US" dirty="0" smtClean="0">
+                <a:hlinkClick r:id="rId13"/>
+              </a:rPr>
+              <a:t>aspx</a:t>
+            </a:r>
+            <a:endParaRPr lang="en-US" dirty="0" smtClean="0"/>
+          </a:p>
+          <a:p>
+            <a:pPr lvl="1"/>
+            <a:endParaRPr lang="en-US" dirty="0"/>
+          </a:p>
+        </p:txBody>
+      </p:sp>
+    </p:spTree>
+    <p:extLst>
+      <p:ext uri="{BB962C8B-B14F-4D97-AF65-F5344CB8AC3E}">
+        <p14:creationId xmlns:p14="http://schemas.microsoft.com/office/powerpoint/2010/main" val="2134096284"/>
+      </p:ext>
+    </p:extLst>
+  </p:cSld>
+  <p:clrMapOvr>
+    <a:masterClrMapping/>
+  </p:clrMapOvr>
+  <p:timing>
+    <p:tnLst>
+      <p:par>
+        <p:cTn id="1" dur="indefinite" restart="never" nodeType="tmRoot"/>
+      </p:par>
+    </p:tnLst>
+  </p:timing>
+</p:sld>
+</file>
+
+<file path=ppt/slides/slide16.xml><?xml version="1.0" encoding="utf-8"?>
+<p:sld xmlns:a="http://schemas.openxmlformats.org/drawingml/2006/main" xmlns:r="http://schemas.openxmlformats.org/officeDocument/2006/relationships" xmlns:p="http://schemas.openxmlformats.org/presentationml/2006/main">
+  <p:cSld>
+    <p:spTree>
+      <p:nvGrpSpPr>
+        <p:cNvPr id="1" name=""/>
+        <p:cNvGrpSpPr/>
+        <p:nvPr/>
+      </p:nvGrpSpPr>
+      <p:grpSpPr>
+        <a:xfrm>
+          <a:off x="0" y="0"/>
+          <a:ext cx="0" cy="0"/>
+          <a:chOff x="0" y="0"/>
+          <a:chExt cx="0" cy="0"/>
+        </a:xfrm>
+      </p:grpSpPr>
+      <p:sp>
+        <p:nvSpPr>
+          <p:cNvPr id="2" name="Title 1"/>
+          <p:cNvSpPr>
+            <a:spLocks noGrp="1"/>
+          </p:cNvSpPr>
+          <p:nvPr>
+            <p:ph type="title"/>
+          </p:nvPr>
+        </p:nvSpPr>
+        <p:spPr/>
+        <p:txBody>
+          <a:bodyPr/>
+          <a:lstStyle/>
+          <a:p>
+            <a:r>
+              <a:rPr lang="en-US" dirty="0" smtClean="0"/>
+              <a:t>Downloads</a:t>
+            </a:r>
+            <a:endParaRPr lang="en-US" dirty="0"/>
+          </a:p>
+        </p:txBody>
+      </p:sp>
+      <p:sp>
+        <p:nvSpPr>
+          <p:cNvPr id="3" name="Content Placeholder 2"/>
+          <p:cNvSpPr>
+            <a:spLocks noGrp="1"/>
+          </p:cNvSpPr>
+          <p:nvPr>
+            <p:ph idx="1"/>
+          </p:nvPr>
+        </p:nvSpPr>
+        <p:spPr/>
+        <p:txBody>
+          <a:bodyPr>
+            <a:normAutofit fontScale="92500" lnSpcReduction="20000"/>
+          </a:bodyPr>
+          <a:lstStyle/>
+          <a:p>
+            <a:r>
+              <a:rPr lang="en-US" dirty="0" smtClean="0"/>
+              <a:t>Visual </a:t>
+            </a:r>
+            <a:r>
+              <a:rPr lang="en-US" dirty="0"/>
+              <a:t>Studio </a:t>
+            </a:r>
+            <a:r>
+              <a:rPr lang="en-US" dirty="0" smtClean="0"/>
+              <a:t>2010</a:t>
+            </a:r>
+            <a:r>
+              <a:rPr lang="en-US" dirty="0"/>
+              <a:t>: </a:t>
+            </a:r>
+            <a:r>
+              <a:rPr lang="en-US" dirty="0">
+                <a:hlinkClick r:id="rId2"/>
+              </a:rPr>
+              <a:t>http://</a:t>
+            </a:r>
+            <a:r>
+              <a:rPr lang="en-US" dirty="0" smtClean="0">
+                <a:hlinkClick r:id="rId2"/>
+              </a:rPr>
+              <a:t>www.visualstudio.com/downloads/download-visual-studio-vs</a:t>
+            </a:r>
+            <a:endParaRPr lang="en-US" dirty="0" smtClean="0"/>
+          </a:p>
+          <a:p>
+            <a:r>
+              <a:rPr lang="en-US" dirty="0" smtClean="0"/>
+              <a:t>Microsoft Visual Studio </a:t>
+            </a:r>
+            <a:r>
+              <a:rPr lang="en-US" dirty="0"/>
+              <a:t>2008 SP1: </a:t>
+            </a:r>
+            <a:r>
+              <a:rPr lang="en-US" dirty="0">
+                <a:hlinkClick r:id="rId3"/>
+              </a:rPr>
+              <a:t>http://</a:t>
+            </a:r>
+            <a:r>
+              <a:rPr lang="en-US" dirty="0" smtClean="0">
+                <a:hlinkClick r:id="rId3"/>
+              </a:rPr>
+              <a:t>www.microsoft.com/en-us/download/details.aspx?id=10986</a:t>
+            </a:r>
+            <a:endParaRPr lang="en-US" dirty="0" smtClean="0"/>
+          </a:p>
+          <a:p>
+            <a:r>
+              <a:rPr lang="en-US" dirty="0" smtClean="0"/>
+              <a:t>Windows SDK for .</a:t>
+            </a:r>
+            <a:r>
+              <a:rPr lang="en-US" dirty="0"/>
+              <a:t>NET Framework 3.5 SP1: </a:t>
+            </a:r>
+            <a:r>
+              <a:rPr lang="en-US" dirty="0">
+                <a:hlinkClick r:id="rId4"/>
+              </a:rPr>
+              <a:t>http://</a:t>
+            </a:r>
+            <a:r>
+              <a:rPr lang="en-US" dirty="0" smtClean="0">
+                <a:hlinkClick r:id="rId4"/>
+              </a:rPr>
+              <a:t>www.microsoft.com/en-us/download/details.aspx?id=3138</a:t>
+            </a:r>
+            <a:endParaRPr lang="en-US" dirty="0" smtClean="0"/>
+          </a:p>
+          <a:p>
+            <a:r>
+              <a:rPr lang="en-US" dirty="0"/>
+              <a:t>UCMA 2.0 Speech Language Packs: </a:t>
+            </a:r>
+            <a:r>
+              <a:rPr lang="en-US" dirty="0">
+                <a:hlinkClick r:id="rId5"/>
+              </a:rPr>
+              <a:t>http://www.microsoft.com/en-us/download/confirmation.aspx?id=19549</a:t>
+            </a:r>
+            <a:endParaRPr lang="en-US" dirty="0"/>
+          </a:p>
+          <a:p>
+            <a:r>
+              <a:rPr lang="en-US" dirty="0"/>
+              <a:t>UCMA 3.0 SDK: </a:t>
+            </a:r>
+            <a:r>
+              <a:rPr lang="en-US" dirty="0">
+                <a:hlinkClick r:id="rId6"/>
+              </a:rPr>
+              <a:t>http://www.microsoft.com/en-us/download/details.aspx?id=10566</a:t>
+            </a:r>
+            <a:endParaRPr lang="en-US" dirty="0"/>
+          </a:p>
+          <a:p>
+            <a:r>
+              <a:rPr lang="en-US" dirty="0"/>
+              <a:t>UCMA 3.0 Runtime: </a:t>
+            </a:r>
+            <a:r>
+              <a:rPr lang="en-US" dirty="0">
+                <a:hlinkClick r:id="rId7"/>
+              </a:rPr>
+              <a:t>http://www.microsoft.com/en-us/download/confirmation.aspx?id=20958</a:t>
+            </a:r>
+            <a:endParaRPr lang="en-US" dirty="0"/>
+          </a:p>
+          <a:p>
+            <a:endParaRPr lang="en-US" dirty="0" smtClean="0"/>
+          </a:p>
+          <a:p>
+            <a:endParaRPr lang="en-US" dirty="0"/>
+          </a:p>
+        </p:txBody>
+      </p:sp>
+    </p:spTree>
+    <p:extLst>
+      <p:ext uri="{BB962C8B-B14F-4D97-AF65-F5344CB8AC3E}">
+        <p14:creationId xmlns:p14="http://schemas.microsoft.com/office/powerpoint/2010/main" val="259878041"/>
+      </p:ext>
+    </p:extLst>
+  </p:cSld>
+  <p:clrMapOvr>
+    <a:masterClrMapping/>
+  </p:clrMapOvr>
+  <p:timing>
+    <p:tnLst>
+      <p:par>
+        <p:cTn id="1" dur="indefinite" restart="never" nodeType="tmRoot"/>
+      </p:par>
+    </p:tnLst>
+  </p:timing>
+</p:sld>
+</file>
+
 <file path=ppt/slides/slide2.xml><?xml version="1.0" encoding="utf-8"?>
+<p:sld xmlns:a="http://schemas.openxmlformats.org/drawingml/2006/main" xmlns:r="http://schemas.openxmlformats.org/officeDocument/2006/relationships" xmlns:p="http://schemas.openxmlformats.org/presentationml/2006/main">
+  <p:cSld>
+    <p:spTree>
+      <p:nvGrpSpPr>
+        <p:cNvPr id="1" name=""/>
+        <p:cNvGrpSpPr/>
+        <p:nvPr/>
+      </p:nvGrpSpPr>
+      <p:grpSpPr>
+        <a:xfrm>
+          <a:off x="0" y="0"/>
+          <a:ext cx="0" cy="0"/>
+          <a:chOff x="0" y="0"/>
+          <a:chExt cx="0" cy="0"/>
+        </a:xfrm>
+      </p:grpSpPr>
+      <p:sp>
+        <p:nvSpPr>
+          <p:cNvPr id="2" name="Title 1"/>
+          <p:cNvSpPr>
+            <a:spLocks noGrp="1"/>
+          </p:cNvSpPr>
+          <p:nvPr>
+            <p:ph type="title"/>
+          </p:nvPr>
+        </p:nvSpPr>
+        <p:spPr/>
+        <p:txBody>
+          <a:bodyPr/>
+          <a:lstStyle/>
+          <a:p>
+            <a:r>
+              <a:rPr lang="en-US" dirty="0" smtClean="0"/>
+              <a:t>Motivation</a:t>
+            </a:r>
+            <a:endParaRPr lang="en-US" dirty="0"/>
+          </a:p>
+        </p:txBody>
+      </p:sp>
+      <p:sp>
+        <p:nvSpPr>
+          <p:cNvPr id="3" name="Content Placeholder 2"/>
+          <p:cNvSpPr>
+            <a:spLocks noGrp="1"/>
+          </p:cNvSpPr>
+          <p:nvPr>
+            <p:ph idx="1"/>
+          </p:nvPr>
+        </p:nvSpPr>
+        <p:spPr/>
+        <p:txBody>
+          <a:bodyPr/>
+          <a:lstStyle/>
+          <a:p>
+            <a:pPr marL="0" indent="0">
+              <a:buNone/>
+            </a:pPr>
+            <a:r>
+              <a:rPr lang="en-US" dirty="0"/>
+              <a:t>Lync is a great tool for communication and collaboration across various business units. It offers a wide variety of capabilities including conferencing. Lync conferences allows users to have application sharing, IM chats and video sharing during the meeting. </a:t>
+            </a:r>
+            <a:r>
+              <a:rPr lang="en-US" dirty="0">
+                <a:solidFill>
+                  <a:srgbClr val="FF0000"/>
+                </a:solidFill>
+              </a:rPr>
+              <a:t>But do you know whether a visually impaired person be able to see the instant messages that is coming across the meeting</a:t>
+            </a:r>
+            <a:r>
+              <a:rPr lang="en-US" dirty="0"/>
+              <a:t>? </a:t>
+            </a:r>
+            <a:r>
+              <a:rPr lang="en-US" dirty="0">
+                <a:solidFill>
+                  <a:srgbClr val="7030A0"/>
+                </a:solidFill>
+              </a:rPr>
+              <a:t>Or will a hearing impaired person be able to hear what is discussed in the meetings</a:t>
+            </a:r>
+            <a:r>
+              <a:rPr lang="en-US" dirty="0"/>
+              <a:t>? </a:t>
+            </a:r>
+            <a:r>
+              <a:rPr lang="en-US" dirty="0">
+                <a:solidFill>
+                  <a:srgbClr val="0070C0"/>
+                </a:solidFill>
+              </a:rPr>
+              <a:t>Or would it simply be nice to have a live-generated transcript of a current or past meeting to review what was discussed</a:t>
+            </a:r>
+            <a:r>
+              <a:rPr lang="en-US" dirty="0"/>
+              <a:t>? Lync Meeting Transcript is created with the aim of helping Lync users to the generates real-time transcripts of Lync meetings.</a:t>
+            </a:r>
+          </a:p>
+        </p:txBody>
+      </p:sp>
+    </p:spTree>
+    <p:extLst>
+      <p:ext uri="{BB962C8B-B14F-4D97-AF65-F5344CB8AC3E}">
+        <p14:creationId xmlns:p14="http://schemas.microsoft.com/office/powerpoint/2010/main" val="3780763423"/>
+      </p:ext>
+    </p:extLst>
+  </p:cSld>
+  <p:clrMapOvr>
+    <a:masterClrMapping/>
+  </p:clrMapOvr>
+  <p:timing>
+    <p:tnLst>
+      <p:par>
+        <p:cTn id="1" dur="indefinite" restart="never" nodeType="tmRoot"/>
+      </p:par>
+    </p:tnLst>
+  </p:timing>
+</p:sld>
+</file>
+
+<file path=ppt/slides/slide3.xml><?xml version="1.0" encoding="utf-8"?>
+<p:sld xmlns:a="http://schemas.openxmlformats.org/drawingml/2006/main" xmlns:r="http://schemas.openxmlformats.org/officeDocument/2006/relationships" xmlns:p="http://schemas.openxmlformats.org/presentationml/2006/main">
+  <p:cSld>
+    <p:spTree>
+      <p:nvGrpSpPr>
+        <p:cNvPr id="1" name=""/>
+        <p:cNvGrpSpPr/>
+        <p:nvPr/>
+      </p:nvGrpSpPr>
+      <p:grpSpPr>
+        <a:xfrm>
+          <a:off x="0" y="0"/>
+          <a:ext cx="0" cy="0"/>
+          <a:chOff x="0" y="0"/>
+          <a:chExt cx="0" cy="0"/>
+        </a:xfrm>
+      </p:grpSpPr>
+      <p:sp>
+        <p:nvSpPr>
+          <p:cNvPr id="2" name="Title 1"/>
+          <p:cNvSpPr>
+            <a:spLocks noGrp="1"/>
+          </p:cNvSpPr>
+          <p:nvPr>
+            <p:ph type="title"/>
+          </p:nvPr>
+        </p:nvSpPr>
+        <p:spPr/>
+        <p:txBody>
+          <a:bodyPr/>
+          <a:lstStyle/>
+          <a:p>
+            <a:r>
+              <a:rPr lang="en-US" dirty="0" smtClean="0"/>
+              <a:t>Motivation</a:t>
+            </a:r>
+            <a:endParaRPr lang="en-US" dirty="0"/>
+          </a:p>
+        </p:txBody>
+      </p:sp>
+      <p:sp>
+        <p:nvSpPr>
+          <p:cNvPr id="3" name="Content Placeholder 2"/>
+          <p:cNvSpPr>
+            <a:spLocks noGrp="1"/>
+          </p:cNvSpPr>
+          <p:nvPr>
+            <p:ph idx="1"/>
+          </p:nvPr>
+        </p:nvSpPr>
+        <p:spPr/>
+        <p:txBody>
+          <a:bodyPr/>
+          <a:lstStyle/>
+          <a:p>
+            <a:r>
+              <a:rPr lang="en-US" dirty="0" smtClean="0"/>
+              <a:t>Add-in productivity tool for conferences</a:t>
+            </a:r>
+          </a:p>
+          <a:p>
+            <a:pPr lvl="1"/>
+            <a:r>
+              <a:rPr lang="en-US" dirty="0" smtClean="0"/>
+              <a:t>For “live” conferences, Allows late-joining participants to see what has been discussed so far</a:t>
+            </a:r>
+          </a:p>
+          <a:p>
+            <a:pPr lvl="1"/>
+            <a:r>
+              <a:rPr lang="en-US" dirty="0" smtClean="0"/>
+              <a:t>For past conferences, allows participants to review the transcript of what was covered in the meeting</a:t>
+            </a:r>
+          </a:p>
+          <a:p>
+            <a:r>
+              <a:rPr lang="en-US" dirty="0" smtClean="0"/>
+              <a:t>Accessibility tool for hearing impaired</a:t>
+            </a:r>
+          </a:p>
+          <a:p>
+            <a:pPr lvl="1"/>
+            <a:r>
+              <a:rPr lang="en-US" dirty="0" smtClean="0"/>
+              <a:t>Real-time transcript of </a:t>
+            </a:r>
+            <a:endParaRPr lang="en-US" dirty="0"/>
+          </a:p>
+        </p:txBody>
+      </p:sp>
+    </p:spTree>
+    <p:extLst>
+      <p:ext uri="{BB962C8B-B14F-4D97-AF65-F5344CB8AC3E}">
+        <p14:creationId xmlns:p14="http://schemas.microsoft.com/office/powerpoint/2010/main" val="3650506833"/>
+      </p:ext>
+    </p:extLst>
+  </p:cSld>
+  <p:clrMapOvr>
+    <a:masterClrMapping/>
+  </p:clrMapOvr>
+  <p:timing>
+    <p:tnLst>
+      <p:par>
+        <p:cTn id="1" dur="indefinite" restart="never" nodeType="tmRoot"/>
+      </p:par>
+    </p:tnLst>
+  </p:timing>
+</p:sld>
+</file>
+
+<file path=ppt/slides/slide4.xml><?xml version="1.0" encoding="utf-8"?>
+<p:sld xmlns:a="http://schemas.openxmlformats.org/drawingml/2006/main" xmlns:r="http://schemas.openxmlformats.org/officeDocument/2006/relationships" xmlns:p="http://schemas.openxmlformats.org/presentationml/2006/main">
+  <p:cSld>
+    <p:spTree>
+      <p:nvGrpSpPr>
+        <p:cNvPr id="1" name=""/>
+        <p:cNvGrpSpPr/>
+        <p:nvPr/>
+      </p:nvGrpSpPr>
+      <p:grpSpPr>
+        <a:xfrm>
+          <a:off x="0" y="0"/>
+          <a:ext cx="0" cy="0"/>
+          <a:chOff x="0" y="0"/>
+          <a:chExt cx="0" cy="0"/>
+        </a:xfrm>
+      </p:grpSpPr>
+      <p:sp>
+        <p:nvSpPr>
+          <p:cNvPr id="2" name="Title 1"/>
+          <p:cNvSpPr>
+            <a:spLocks noGrp="1"/>
+          </p:cNvSpPr>
+          <p:nvPr>
+            <p:ph type="title"/>
+          </p:nvPr>
+        </p:nvSpPr>
+        <p:spPr/>
+        <p:txBody>
+          <a:bodyPr/>
+          <a:lstStyle/>
+          <a:p>
+            <a:r>
+              <a:rPr lang="en-US" dirty="0" smtClean="0"/>
+              <a:t>Related Work</a:t>
+            </a:r>
+            <a:endParaRPr lang="en-US" dirty="0"/>
+          </a:p>
+        </p:txBody>
+      </p:sp>
+      <p:sp>
+        <p:nvSpPr>
+          <p:cNvPr id="3" name="Content Placeholder 2"/>
+          <p:cNvSpPr>
+            <a:spLocks noGrp="1"/>
+          </p:cNvSpPr>
+          <p:nvPr>
+            <p:ph idx="1"/>
+          </p:nvPr>
+        </p:nvSpPr>
+        <p:spPr>
+          <a:xfrm>
+            <a:off x="838200" y="1894636"/>
+            <a:ext cx="10515600" cy="4351338"/>
+          </a:xfrm>
+        </p:spPr>
+        <p:txBody>
+          <a:bodyPr/>
+          <a:lstStyle/>
+          <a:p>
+            <a:r>
+              <a:rPr lang="en-US" dirty="0" smtClean="0"/>
+              <a:t>Lync Meeting Recorder</a:t>
+            </a:r>
+          </a:p>
+          <a:p>
+            <a:pPr lvl="1"/>
+            <a:r>
+              <a:rPr lang="en-US" dirty="0" smtClean="0"/>
+              <a:t>Allows client-side recording of Lync Meetings</a:t>
+            </a:r>
+          </a:p>
+          <a:p>
+            <a:pPr lvl="1"/>
+            <a:r>
+              <a:rPr lang="en-US" dirty="0" smtClean="0"/>
+              <a:t>Limitations: </a:t>
+            </a:r>
+          </a:p>
+          <a:p>
+            <a:pPr lvl="2"/>
+            <a:r>
+              <a:rPr lang="en-US" dirty="0" smtClean="0"/>
+              <a:t>Requires participants to start/stop recording upfront</a:t>
+            </a:r>
+          </a:p>
+          <a:p>
+            <a:pPr lvl="2"/>
+            <a:r>
+              <a:rPr lang="en-US" dirty="0" smtClean="0"/>
+              <a:t>No</a:t>
+            </a:r>
+          </a:p>
+          <a:p>
+            <a:r>
+              <a:rPr lang="en-US" dirty="0" smtClean="0"/>
+              <a:t>IVR Calling Applications </a:t>
+            </a:r>
+          </a:p>
+          <a:p>
+            <a:pPr lvl="1"/>
+            <a:r>
+              <a:rPr lang="en-US" dirty="0" smtClean="0"/>
+              <a:t>Limitations: </a:t>
+            </a:r>
+          </a:p>
+          <a:p>
+            <a:r>
+              <a:rPr lang="en-US" dirty="0" smtClean="0">
+                <a:hlinkClick r:id="rId2"/>
+              </a:rPr>
+              <a:t>Lync Client Application with Bing Translator Service </a:t>
+            </a:r>
+            <a:endParaRPr lang="en-US" dirty="0" smtClean="0"/>
+          </a:p>
+          <a:p>
+            <a:pPr lvl="1"/>
+            <a:r>
+              <a:rPr lang="en-US" dirty="0" smtClean="0"/>
+              <a:t>Limitations: </a:t>
+            </a:r>
+          </a:p>
+          <a:p>
+            <a:endParaRPr lang="en-US" dirty="0"/>
+          </a:p>
+        </p:txBody>
+      </p:sp>
+    </p:spTree>
+    <p:extLst>
+      <p:ext uri="{BB962C8B-B14F-4D97-AF65-F5344CB8AC3E}">
+        <p14:creationId xmlns:p14="http://schemas.microsoft.com/office/powerpoint/2010/main" val="3198462937"/>
+      </p:ext>
+    </p:extLst>
+  </p:cSld>
+  <p:clrMapOvr>
+    <a:masterClrMapping/>
+  </p:clrMapOvr>
+  <p:timing>
+    <p:tnLst>
+      <p:par>
+        <p:cTn id="1" dur="indefinite" restart="never" nodeType="tmRoot"/>
+      </p:par>
+    </p:tnLst>
+  </p:timing>
+</p:sld>
+</file>
+
+<file path=ppt/slides/slide5.xml><?xml version="1.0" encoding="utf-8"?>
+<p:sld xmlns:a="http://schemas.openxmlformats.org/drawingml/2006/main" xmlns:r="http://schemas.openxmlformats.org/officeDocument/2006/relationships" xmlns:p="http://schemas.openxmlformats.org/presentationml/2006/main">
+  <p:cSld>
+    <p:spTree>
+      <p:nvGrpSpPr>
+        <p:cNvPr id="1" name=""/>
+        <p:cNvGrpSpPr/>
+        <p:nvPr/>
+      </p:nvGrpSpPr>
+      <p:grpSpPr>
+        <a:xfrm>
+          <a:off x="0" y="0"/>
+          <a:ext cx="0" cy="0"/>
+          <a:chOff x="0" y="0"/>
+          <a:chExt cx="0" cy="0"/>
+        </a:xfrm>
+      </p:grpSpPr>
+      <p:sp>
+        <p:nvSpPr>
+          <p:cNvPr id="2" name="Title 1"/>
+          <p:cNvSpPr>
+            <a:spLocks noGrp="1"/>
+          </p:cNvSpPr>
+          <p:nvPr>
+            <p:ph type="title"/>
+          </p:nvPr>
+        </p:nvSpPr>
+        <p:spPr/>
+        <p:txBody>
+          <a:bodyPr/>
+          <a:lstStyle/>
+          <a:p>
+            <a:r>
+              <a:rPr lang="en-US" dirty="0" smtClean="0"/>
+              <a:t>Approach</a:t>
+            </a:r>
+            <a:endParaRPr lang="en-US" dirty="0"/>
+          </a:p>
+        </p:txBody>
+      </p:sp>
+      <p:sp>
+        <p:nvSpPr>
+          <p:cNvPr id="3" name="Content Placeholder 2"/>
+          <p:cNvSpPr>
+            <a:spLocks noGrp="1"/>
+          </p:cNvSpPr>
+          <p:nvPr>
+            <p:ph idx="1"/>
+          </p:nvPr>
+        </p:nvSpPr>
+        <p:spPr/>
+        <p:txBody>
+          <a:bodyPr>
+            <a:normAutofit/>
+          </a:bodyPr>
+          <a:lstStyle/>
+          <a:p>
+            <a:r>
+              <a:rPr lang="en-US" dirty="0" smtClean="0"/>
+              <a:t>Server bot application that accepts incoming calls or conference invites and joins as a trusted user endpoint</a:t>
+            </a:r>
+          </a:p>
+          <a:p>
+            <a:pPr lvl="1"/>
+            <a:r>
+              <a:rPr lang="en-US" dirty="0" smtClean="0"/>
+              <a:t>Subscribes to events on Conversation/Conference (i.e. user joins/leaves, modality change, state changes)</a:t>
+            </a:r>
+          </a:p>
+          <a:p>
+            <a:pPr lvl="1"/>
+            <a:r>
+              <a:rPr lang="en-US" dirty="0" smtClean="0"/>
+              <a:t>Subscribes to events on each </a:t>
+            </a:r>
+            <a:r>
+              <a:rPr lang="en-US" dirty="0" err="1" smtClean="0"/>
+              <a:t>ConversationParticipant</a:t>
+            </a:r>
+            <a:r>
+              <a:rPr lang="en-US" dirty="0" smtClean="0"/>
+              <a:t> (i.e. participant property changes)</a:t>
+            </a:r>
+            <a:endParaRPr lang="en-US" dirty="0" smtClean="0"/>
+          </a:p>
+          <a:p>
+            <a:pPr lvl="1"/>
+            <a:r>
+              <a:rPr lang="en-US" dirty="0" smtClean="0"/>
+              <a:t>Subscribes to Call/Flow events on each active modality (state change, message received, speech detected)</a:t>
+            </a:r>
+          </a:p>
+          <a:p>
+            <a:pPr lvl="2"/>
+            <a:r>
+              <a:rPr lang="en-US" dirty="0" smtClean="0"/>
+              <a:t>Supported modalities: </a:t>
+            </a:r>
+            <a:r>
+              <a:rPr lang="en-US" dirty="0" err="1" smtClean="0"/>
+              <a:t>AudioVideo</a:t>
+            </a:r>
+            <a:r>
+              <a:rPr lang="en-US" dirty="0" smtClean="0"/>
+              <a:t>, </a:t>
+            </a:r>
+            <a:r>
+              <a:rPr lang="en-US" dirty="0" err="1" smtClean="0"/>
+              <a:t>InstantMessaging</a:t>
+            </a:r>
+            <a:endParaRPr lang="en-US" dirty="0" smtClean="0"/>
+          </a:p>
+          <a:p>
+            <a:pPr lvl="1"/>
+            <a:r>
+              <a:rPr lang="en-US" dirty="0" smtClean="0"/>
+              <a:t>Generates messages for raised events and records as item in </a:t>
+            </a:r>
+            <a:r>
+              <a:rPr lang="en-US" dirty="0" err="1" smtClean="0"/>
+              <a:t>MeetingTranscript</a:t>
+            </a:r>
+            <a:endParaRPr lang="en-US" dirty="0" smtClean="0"/>
+          </a:p>
+          <a:p>
+            <a:pPr lvl="2"/>
+            <a:endParaRPr lang="en-US" dirty="0" smtClean="0"/>
+          </a:p>
+        </p:txBody>
+      </p:sp>
+    </p:spTree>
+    <p:extLst>
+      <p:ext uri="{BB962C8B-B14F-4D97-AF65-F5344CB8AC3E}">
+        <p14:creationId xmlns:p14="http://schemas.microsoft.com/office/powerpoint/2010/main" val="4008498076"/>
+      </p:ext>
+    </p:extLst>
+  </p:cSld>
+  <p:clrMapOvr>
+    <a:masterClrMapping/>
+  </p:clrMapOvr>
+  <p:timing>
+    <p:tnLst>
+      <p:par>
+        <p:cTn id="1" dur="indefinite" restart="never" nodeType="tmRoot"/>
+      </p:par>
+    </p:tnLst>
+  </p:timing>
+</p:sld>
+</file>
+
+<file path=ppt/slides/slide6.xml><?xml version="1.0" encoding="utf-8"?>
+<p:sld xmlns:a="http://schemas.openxmlformats.org/drawingml/2006/main" xmlns:r="http://schemas.openxmlformats.org/officeDocument/2006/relationships" xmlns:p="http://schemas.openxmlformats.org/presentationml/2006/main">
+  <p:cSld>
+    <p:spTree>
+      <p:nvGrpSpPr>
+        <p:cNvPr id="1" name=""/>
+        <p:cNvGrpSpPr/>
+        <p:nvPr/>
+      </p:nvGrpSpPr>
+      <p:grpSpPr>
+        <a:xfrm>
+          <a:off x="0" y="0"/>
+          <a:ext cx="0" cy="0"/>
+          <a:chOff x="0" y="0"/>
+          <a:chExt cx="0" cy="0"/>
+        </a:xfrm>
+      </p:grpSpPr>
+      <p:sp>
+        <p:nvSpPr>
+          <p:cNvPr id="2" name="Title 1"/>
+          <p:cNvSpPr>
+            <a:spLocks noGrp="1"/>
+          </p:cNvSpPr>
+          <p:nvPr>
+            <p:ph type="title"/>
+          </p:nvPr>
+        </p:nvSpPr>
+        <p:spPr/>
+        <p:txBody>
+          <a:bodyPr/>
+          <a:lstStyle/>
+          <a:p>
+            <a:r>
+              <a:rPr lang="en-US" dirty="0" smtClean="0"/>
+              <a:t>Speech Recognition</a:t>
+            </a:r>
+            <a:endParaRPr lang="en-US" dirty="0"/>
+          </a:p>
+        </p:txBody>
+      </p:sp>
+      <p:sp>
+        <p:nvSpPr>
+          <p:cNvPr id="3" name="Content Placeholder 2"/>
+          <p:cNvSpPr>
+            <a:spLocks noGrp="1"/>
+          </p:cNvSpPr>
+          <p:nvPr>
+            <p:ph idx="1"/>
+          </p:nvPr>
+        </p:nvSpPr>
+        <p:spPr/>
+        <p:txBody>
+          <a:bodyPr>
+            <a:normAutofit fontScale="55000" lnSpcReduction="20000"/>
+          </a:bodyPr>
+          <a:lstStyle/>
+          <a:p>
+            <a:r>
+              <a:rPr lang="en-US" dirty="0"/>
+              <a:t>Speech Recognition Engine attached to the active (dominant speaker) </a:t>
+            </a:r>
+            <a:r>
+              <a:rPr lang="en-US" dirty="0" err="1"/>
+              <a:t>AudioVideoFlow</a:t>
+            </a:r>
+            <a:r>
+              <a:rPr lang="en-US" dirty="0"/>
+              <a:t> that attempts to recognize when speech is detected</a:t>
+            </a:r>
+          </a:p>
+          <a:p>
+            <a:pPr marL="0" indent="0">
+              <a:buNone/>
+            </a:pPr>
+            <a:endParaRPr lang="en-US" b="1" dirty="0" smtClean="0"/>
+          </a:p>
+          <a:p>
+            <a:pPr marL="0" indent="0">
+              <a:buNone/>
+            </a:pPr>
+            <a:r>
+              <a:rPr lang="en-US" b="1" dirty="0" smtClean="0"/>
+              <a:t>What </a:t>
+            </a:r>
+            <a:r>
+              <a:rPr lang="en-US" b="1" dirty="0"/>
+              <a:t>is the difference between </a:t>
+            </a:r>
+            <a:r>
+              <a:rPr lang="en-US" b="1" dirty="0" err="1"/>
+              <a:t>System.Speech.Recognition</a:t>
+            </a:r>
+            <a:r>
+              <a:rPr lang="en-US" b="1" dirty="0"/>
+              <a:t> and </a:t>
+            </a:r>
+            <a:r>
+              <a:rPr lang="en-US" b="1" dirty="0" err="1"/>
+              <a:t>Microsoft.Speech.Recognition</a:t>
+            </a:r>
+            <a:r>
+              <a:rPr lang="en-US" b="1" dirty="0" smtClean="0"/>
+              <a:t>?</a:t>
+            </a:r>
+          </a:p>
+          <a:p>
+            <a:pPr marL="0" indent="0">
+              <a:buNone/>
+            </a:pPr>
+            <a:endParaRPr lang="en-US" b="1" dirty="0"/>
+          </a:p>
+          <a:p>
+            <a:r>
+              <a:rPr lang="en-US" dirty="0" smtClean="0"/>
+              <a:t>The </a:t>
+            </a:r>
+            <a:r>
+              <a:rPr lang="en-US" dirty="0"/>
+              <a:t>short answer is that </a:t>
+            </a:r>
+            <a:r>
+              <a:rPr lang="en-US" dirty="0" err="1"/>
+              <a:t>Microsoft.Speech.Recognition</a:t>
+            </a:r>
+            <a:r>
+              <a:rPr lang="en-US" dirty="0"/>
+              <a:t> uses the Server version of SAPI, while </a:t>
+            </a:r>
+            <a:r>
+              <a:rPr lang="en-US" dirty="0" err="1"/>
+              <a:t>System.Speech.Recognition</a:t>
+            </a:r>
+            <a:r>
+              <a:rPr lang="en-US" dirty="0"/>
+              <a:t> uses the Desktop version of SAPI.</a:t>
+            </a:r>
+          </a:p>
+          <a:p>
+            <a:endParaRPr lang="en-US" dirty="0"/>
+          </a:p>
+          <a:p>
+            <a:r>
+              <a:rPr lang="en-US" dirty="0"/>
+              <a:t>The APIs are mostly the same, but the underlying engines are different. Typically, the Server engine is designed to accept telephone-quality audio for command &amp; control applications; the Desktop engine is designed to accept higher-quality audio for both command &amp; control and dictation applications.</a:t>
+            </a:r>
+          </a:p>
+          <a:p>
+            <a:endParaRPr lang="en-US" dirty="0"/>
+          </a:p>
+          <a:p>
+            <a:r>
+              <a:rPr lang="en-US" dirty="0"/>
+              <a:t>You can use </a:t>
+            </a:r>
+            <a:r>
+              <a:rPr lang="en-US" dirty="0" err="1"/>
+              <a:t>System.Speech.Recognition</a:t>
+            </a:r>
+            <a:r>
+              <a:rPr lang="en-US" dirty="0"/>
+              <a:t> on a server OS, but it's not designed to scale nearly as well as </a:t>
+            </a:r>
+            <a:r>
+              <a:rPr lang="en-US" dirty="0" err="1"/>
+              <a:t>Microsoft.Speech.Recognition</a:t>
+            </a:r>
+            <a:r>
+              <a:rPr lang="en-US" dirty="0"/>
+              <a:t>.</a:t>
+            </a:r>
+          </a:p>
+          <a:p>
+            <a:endParaRPr lang="en-US" dirty="0"/>
+          </a:p>
+          <a:p>
+            <a:r>
+              <a:rPr lang="en-US" dirty="0"/>
+              <a:t>The differences are that the Server engine won't need training, and will work with lower-quality audio, but will have a lower recognition quality than the Desktop engine.</a:t>
+            </a:r>
+          </a:p>
+          <a:p>
+            <a:endParaRPr lang="en-US" dirty="0"/>
+          </a:p>
+        </p:txBody>
+      </p:sp>
+    </p:spTree>
+    <p:extLst>
+      <p:ext uri="{BB962C8B-B14F-4D97-AF65-F5344CB8AC3E}">
+        <p14:creationId xmlns:p14="http://schemas.microsoft.com/office/powerpoint/2010/main" val="3387534499"/>
+      </p:ext>
+    </p:extLst>
+  </p:cSld>
+  <p:clrMapOvr>
+    <a:masterClrMapping/>
+  </p:clrMapOvr>
+  <p:timing>
+    <p:tnLst>
+      <p:par>
+        <p:cTn id="1" dur="indefinite" restart="never" nodeType="tmRoot"/>
+      </p:par>
+    </p:tnLst>
+  </p:timing>
+</p:sld>
+</file>
+
+<file path=ppt/slides/slide7.xml><?xml version="1.0" encoding="utf-8"?>
+<p:sld xmlns:a="http://schemas.openxmlformats.org/drawingml/2006/main" xmlns:r="http://schemas.openxmlformats.org/officeDocument/2006/relationships" xmlns:p="http://schemas.openxmlformats.org/presentationml/2006/main">
+  <p:cSld>
+    <p:spTree>
+      <p:nvGrpSpPr>
+        <p:cNvPr id="1" name=""/>
+        <p:cNvGrpSpPr/>
+        <p:nvPr/>
+      </p:nvGrpSpPr>
+      <p:grpSpPr>
+        <a:xfrm>
+          <a:off x="0" y="0"/>
+          <a:ext cx="0" cy="0"/>
+          <a:chOff x="0" y="0"/>
+          <a:chExt cx="0" cy="0"/>
+        </a:xfrm>
+      </p:grpSpPr>
+      <p:sp>
+        <p:nvSpPr>
+          <p:cNvPr id="2" name="Title 1"/>
+          <p:cNvSpPr>
+            <a:spLocks noGrp="1"/>
+          </p:cNvSpPr>
+          <p:nvPr>
+            <p:ph type="title"/>
+          </p:nvPr>
+        </p:nvSpPr>
+        <p:spPr/>
+        <p:txBody>
+          <a:bodyPr/>
+          <a:lstStyle/>
+          <a:p>
+            <a:r>
+              <a:rPr lang="en-US" dirty="0" smtClean="0"/>
+              <a:t>UCMA</a:t>
+            </a:r>
+            <a:endParaRPr lang="en-US" dirty="0"/>
+          </a:p>
+        </p:txBody>
+      </p:sp>
+      <p:sp>
+        <p:nvSpPr>
+          <p:cNvPr id="3" name="Content Placeholder 2"/>
+          <p:cNvSpPr>
+            <a:spLocks noGrp="1"/>
+          </p:cNvSpPr>
+          <p:nvPr>
+            <p:ph idx="1"/>
+          </p:nvPr>
+        </p:nvSpPr>
+        <p:spPr/>
+        <p:txBody>
+          <a:bodyPr>
+            <a:normAutofit lnSpcReduction="10000"/>
+          </a:bodyPr>
+          <a:lstStyle/>
+          <a:p>
+            <a:r>
+              <a:rPr lang="en-US" dirty="0"/>
+              <a:t>Every UCMA application has the following prerequisites:</a:t>
+            </a:r>
+          </a:p>
+          <a:p>
+            <a:endParaRPr lang="en-US" dirty="0"/>
+          </a:p>
+          <a:p>
+            <a:r>
+              <a:rPr lang="en-US" dirty="0"/>
+              <a:t>•Microsoft Office Communications Server 2007 R2</a:t>
+            </a:r>
+          </a:p>
+          <a:p>
+            <a:endParaRPr lang="en-US" dirty="0"/>
+          </a:p>
+          <a:p>
+            <a:endParaRPr lang="en-US" dirty="0"/>
+          </a:p>
+          <a:p>
+            <a:r>
+              <a:rPr lang="en-US" dirty="0"/>
+              <a:t>•VC++ 2008</a:t>
+            </a:r>
+          </a:p>
+          <a:p>
+            <a:endParaRPr lang="en-US" dirty="0"/>
+          </a:p>
+          <a:p>
+            <a:endParaRPr lang="en-US" dirty="0"/>
+          </a:p>
+          <a:p>
+            <a:r>
+              <a:rPr lang="en-US" dirty="0"/>
+              <a:t>•microsoft.rtc.collaboration.dll</a:t>
+            </a:r>
+          </a:p>
+          <a:p>
+            <a:endParaRPr lang="en-US" dirty="0"/>
+          </a:p>
+          <a:p>
+            <a:endParaRPr lang="en-US" dirty="0"/>
+          </a:p>
+        </p:txBody>
+      </p:sp>
+    </p:spTree>
+    <p:extLst>
+      <p:ext uri="{BB962C8B-B14F-4D97-AF65-F5344CB8AC3E}">
+        <p14:creationId xmlns:p14="http://schemas.microsoft.com/office/powerpoint/2010/main" val="3223988645"/>
+      </p:ext>
+    </p:extLst>
+  </p:cSld>
+  <p:clrMapOvr>
+    <a:masterClrMapping/>
+  </p:clrMapOvr>
+  <p:timing>
+    <p:tnLst>
+      <p:par>
+        <p:cTn id="1" dur="indefinite" restart="never" nodeType="tmRoot"/>
+      </p:par>
+    </p:tnLst>
+  </p:timing>
+</p:sld>
+</file>
+
+<file path=ppt/slides/slide8.xml><?xml version="1.0" encoding="utf-8"?>
 <p:sld xmlns:a="http://schemas.openxmlformats.org/drawingml/2006/main" xmlns:r="http://schemas.openxmlformats.org/officeDocument/2006/relationships" xmlns:p="http://schemas.openxmlformats.org/presentationml/2006/main">
   <p:cSld>
     <p:spTree>
@@ -3072,8 +4845,8 @@
         </p:blipFill>
         <p:spPr>
           <a:xfrm>
-            <a:off x="1915172" y="175534"/>
-            <a:ext cx="8174760" cy="6414452"/>
+            <a:off x="1382751" y="144966"/>
+            <a:ext cx="9701561" cy="6478858"/>
           </a:xfrm>
           <a:prstGeom prst="rect">
             <a:avLst/>
@@ -3100,7 +4873,7 @@
 </p:sld>
 </file>
 
-<file path=ppt/slides/slide3.xml><?xml version="1.0" encoding="utf-8"?>
+<file path=ppt/slides/slide9.xml><?xml version="1.0" encoding="utf-8"?>
 <p:sld xmlns:a="http://schemas.openxmlformats.org/drawingml/2006/main" xmlns:r="http://schemas.openxmlformats.org/officeDocument/2006/relationships" xmlns:p="http://schemas.openxmlformats.org/presentationml/2006/main">
   <p:cSld>
     <p:spTree>
@@ -3151,119 +4924,6 @@
     <p:extLst>
       <p:ext uri="{BB962C8B-B14F-4D97-AF65-F5344CB8AC3E}">
         <p14:creationId xmlns:p14="http://schemas.microsoft.com/office/powerpoint/2010/main" val="3650903839"/>
-      </p:ext>
-    </p:extLst>
-  </p:cSld>
-  <p:clrMapOvr>
-    <a:masterClrMapping/>
-  </p:clrMapOvr>
-  <p:timing>
-    <p:tnLst>
-      <p:par>
-        <p:cTn id="1" dur="indefinite" restart="never" nodeType="tmRoot"/>
-      </p:par>
-    </p:tnLst>
-  </p:timing>
-</p:sld>
-</file>
-
-<file path=ppt/slides/slide4.xml><?xml version="1.0" encoding="utf-8"?>
-<p:sld xmlns:a="http://schemas.openxmlformats.org/drawingml/2006/main" xmlns:r="http://schemas.openxmlformats.org/officeDocument/2006/relationships" xmlns:p="http://schemas.openxmlformats.org/presentationml/2006/main">
-  <p:cSld>
-    <p:spTree>
-      <p:nvGrpSpPr>
-        <p:cNvPr id="1" name=""/>
-        <p:cNvGrpSpPr/>
-        <p:nvPr/>
-      </p:nvGrpSpPr>
-      <p:grpSpPr>
-        <a:xfrm>
-          <a:off x="0" y="0"/>
-          <a:ext cx="0" cy="0"/>
-          <a:chOff x="0" y="0"/>
-          <a:chExt cx="0" cy="0"/>
-        </a:xfrm>
-      </p:grpSpPr>
-      <p:sp>
-        <p:nvSpPr>
-          <p:cNvPr id="3" name="Title 2"/>
-          <p:cNvSpPr>
-            <a:spLocks noGrp="1"/>
-          </p:cNvSpPr>
-          <p:nvPr>
-            <p:ph type="title"/>
-          </p:nvPr>
-        </p:nvSpPr>
-        <p:spPr/>
-        <p:txBody>
-          <a:bodyPr/>
-          <a:lstStyle/>
-          <a:p>
-            <a:r>
-              <a:rPr lang="en-US" dirty="0" smtClean="0"/>
-              <a:t>Sample </a:t>
-            </a:r>
-            <a:r>
-              <a:rPr lang="en-US" dirty="0" err="1" smtClean="0"/>
-              <a:t>BotApplication</a:t>
-            </a:r>
-            <a:r>
-              <a:rPr lang="en-US" dirty="0"/>
-              <a:t> </a:t>
-            </a:r>
-            <a:r>
-              <a:rPr lang="en-US" dirty="0" smtClean="0"/>
-              <a:t>Output Transcript:</a:t>
-            </a:r>
-            <a:endParaRPr lang="en-US" dirty="0"/>
-          </a:p>
-        </p:txBody>
-      </p:sp>
-      <p:sp>
-        <p:nvSpPr>
-          <p:cNvPr id="5" name="Content Placeholder 4"/>
-          <p:cNvSpPr>
-            <a:spLocks noGrp="1"/>
-          </p:cNvSpPr>
-          <p:nvPr>
-            <p:ph sz="half" idx="1"/>
-          </p:nvPr>
-        </p:nvSpPr>
-        <p:spPr/>
-        <p:txBody>
-          <a:bodyPr/>
-          <a:lstStyle/>
-          <a:p>
-            <a:pPr marL="0" indent="0">
-              <a:buNone/>
-            </a:pPr>
-            <a:endParaRPr lang="en-US" dirty="0"/>
-          </a:p>
-        </p:txBody>
-      </p:sp>
-      <p:sp>
-        <p:nvSpPr>
-          <p:cNvPr id="6" name="Content Placeholder 5"/>
-          <p:cNvSpPr>
-            <a:spLocks noGrp="1"/>
-          </p:cNvSpPr>
-          <p:nvPr>
-            <p:ph sz="half" idx="2"/>
-          </p:nvPr>
-        </p:nvSpPr>
-        <p:spPr/>
-        <p:txBody>
-          <a:bodyPr/>
-          <a:lstStyle/>
-          <a:p>
-            <a:endParaRPr lang="en-US" dirty="0"/>
-          </a:p>
-        </p:txBody>
-      </p:sp>
-    </p:spTree>
-    <p:extLst>
-      <p:ext uri="{BB962C8B-B14F-4D97-AF65-F5344CB8AC3E}">
-        <p14:creationId xmlns:p14="http://schemas.microsoft.com/office/powerpoint/2010/main" val="4068842830"/>
       </p:ext>
     </p:extLst>
   </p:cSld>

</xml_diff>